<commit_message>
ultimos cambios para definir la rama MASTER inicial
</commit_message>
<xml_diff>
--- a/Historyboard_RH.pptx
+++ b/Historyboard_RH.pptx
@@ -8,6 +8,7 @@
     <p:sldId id="256" r:id="rId2"/>
     <p:sldId id="257" r:id="rId3"/>
     <p:sldId id="258" r:id="rId4"/>
+    <p:sldId id="259" r:id="rId5"/>
   </p:sldIdLst>
   <p:sldSz cx="12192000" cy="6858000"/>
   <p:notesSz cx="6858000" cy="9144000"/>
@@ -106,6 +107,11 @@
       </a:defRPr>
     </a:lvl9pPr>
   </p:defaultTextStyle>
+  <p:extLst>
+    <p:ext uri="{EFAFB233-063F-42B5-8137-9DF3F51BA10A}">
+      <p15:sldGuideLst xmlns:p15="http://schemas.microsoft.com/office/powerpoint/2012/main"/>
+    </p:ext>
+  </p:extLst>
 </p:presentation>
 </file>
 
@@ -3022,6 +3028,11 @@
             <a:avLst/>
           </a:prstGeom>
           <a:noFill/>
+          <a:ln>
+            <a:solidFill>
+              <a:srgbClr val="FF0000"/>
+            </a:solidFill>
+          </a:ln>
         </p:spPr>
         <p:style>
           <a:lnRef idx="2">
@@ -3179,6 +3190,11 @@
             <a:avLst/>
           </a:prstGeom>
           <a:noFill/>
+          <a:ln>
+            <a:solidFill>
+              <a:srgbClr val="FF0000"/>
+            </a:solidFill>
+          </a:ln>
         </p:spPr>
         <p:style>
           <a:lnRef idx="2">
@@ -3499,6 +3515,11 @@
             <a:avLst/>
           </a:prstGeom>
           <a:noFill/>
+          <a:ln>
+            <a:solidFill>
+              <a:srgbClr val="FF0000"/>
+            </a:solidFill>
+          </a:ln>
         </p:spPr>
         <p:style>
           <a:lnRef idx="2">
@@ -4310,6 +4331,11 @@
             <a:avLst/>
           </a:prstGeom>
           <a:noFill/>
+          <a:ln>
+            <a:solidFill>
+              <a:srgbClr val="00B050"/>
+            </a:solidFill>
+          </a:ln>
         </p:spPr>
         <p:style>
           <a:lnRef idx="2">
@@ -4555,6 +4581,11 @@
             <a:avLst/>
           </a:prstGeom>
           <a:noFill/>
+          <a:ln>
+            <a:solidFill>
+              <a:srgbClr val="00B050"/>
+            </a:solidFill>
+          </a:ln>
         </p:spPr>
         <p:style>
           <a:lnRef idx="2">
@@ -4867,6 +4898,11 @@
             <a:avLst/>
           </a:prstGeom>
           <a:noFill/>
+          <a:ln>
+            <a:solidFill>
+              <a:srgbClr val="00B050"/>
+            </a:solidFill>
+          </a:ln>
         </p:spPr>
         <p:style>
           <a:lnRef idx="2">
@@ -6544,7 +6580,7 @@
         </p:nvSpPr>
         <p:spPr>
           <a:xfrm>
-            <a:off x="9814463" y="1116918"/>
+            <a:off x="10282147" y="1388133"/>
             <a:ext cx="1262663" cy="446931"/>
           </a:xfrm>
           <a:prstGeom prst="roundRect">
@@ -6757,7 +6793,7 @@
         </p:nvSpPr>
         <p:spPr>
           <a:xfrm>
-            <a:off x="8480371" y="1732787"/>
+            <a:off x="7588999" y="1732787"/>
             <a:ext cx="711755" cy="369332"/>
           </a:xfrm>
           <a:prstGeom prst="rect">
@@ -6774,6 +6810,478 @@
             <a:r>
               <a:rPr lang="es-MX" dirty="0" smtClean="0"/>
               <a:t>Edad:</a:t>
+            </a:r>
+            <a:endParaRPr lang="es-MX" dirty="0"/>
+          </a:p>
+        </p:txBody>
+      </p:sp>
+      <p:sp>
+        <p:nvSpPr>
+          <p:cNvPr id="40" name="CuadroTexto 39"/>
+          <p:cNvSpPr txBox="1"/>
+          <p:nvPr/>
+        </p:nvSpPr>
+        <p:spPr>
+          <a:xfrm>
+            <a:off x="8240951" y="1711522"/>
+            <a:ext cx="1471276" cy="369332"/>
+          </a:xfrm>
+          <a:prstGeom prst="rect">
+            <a:avLst/>
+          </a:prstGeom>
+          <a:noFill/>
+          <a:ln>
+            <a:solidFill>
+              <a:schemeClr val="accent1">
+                <a:shade val="50000"/>
+              </a:schemeClr>
+            </a:solidFill>
+          </a:ln>
+        </p:spPr>
+        <p:txBody>
+          <a:bodyPr wrap="square" rtlCol="0">
+            <a:spAutoFit/>
+          </a:bodyPr>
+          <a:lstStyle/>
+          <a:p>
+            <a:r>
+              <a:rPr lang="es-MX" dirty="0" err="1" smtClean="0"/>
+              <a:t>Pkr_edades</a:t>
+            </a:r>
+            <a:endParaRPr lang="es-MX" dirty="0"/>
+          </a:p>
+        </p:txBody>
+      </p:sp>
+      <p:sp>
+        <p:nvSpPr>
+          <p:cNvPr id="41" name="Rectángulo redondeado 40"/>
+          <p:cNvSpPr/>
+          <p:nvPr/>
+        </p:nvSpPr>
+        <p:spPr>
+          <a:xfrm>
+            <a:off x="10282146" y="2621356"/>
+            <a:ext cx="1262663" cy="446931"/>
+          </a:xfrm>
+          <a:prstGeom prst="roundRect">
+            <a:avLst/>
+          </a:prstGeom>
+        </p:spPr>
+        <p:style>
+          <a:lnRef idx="2">
+            <a:schemeClr val="accent1">
+              <a:shade val="50000"/>
+            </a:schemeClr>
+          </a:lnRef>
+          <a:fillRef idx="1">
+            <a:schemeClr val="accent1"/>
+          </a:fillRef>
+          <a:effectRef idx="0">
+            <a:schemeClr val="accent1"/>
+          </a:effectRef>
+          <a:fontRef idx="minor">
+            <a:schemeClr val="lt1"/>
+          </a:fontRef>
+        </p:style>
+        <p:txBody>
+          <a:bodyPr rtlCol="0" anchor="ctr"/>
+          <a:lstStyle/>
+          <a:p>
+            <a:pPr algn="ctr"/>
+            <a:r>
+              <a:rPr lang="es-MX" dirty="0" smtClean="0"/>
+              <a:t>generar</a:t>
+            </a:r>
+            <a:endParaRPr lang="es-MX" dirty="0"/>
+          </a:p>
+        </p:txBody>
+      </p:sp>
+      <p:graphicFrame>
+        <p:nvGraphicFramePr>
+          <p:cNvPr id="2" name="Tabla 1"/>
+          <p:cNvGraphicFramePr>
+            <a:graphicFrameLocks noGrp="1"/>
+          </p:cNvGraphicFramePr>
+          <p:nvPr>
+            <p:extLst>
+              <p:ext uri="{D42A27DB-BD31-4B8C-83A1-F6EECF244321}">
+                <p14:modId xmlns:p14="http://schemas.microsoft.com/office/powerpoint/2010/main" val="4117828570"/>
+              </p:ext>
+            </p:extLst>
+          </p:nvPr>
+        </p:nvGraphicFramePr>
+        <p:xfrm>
+          <a:off x="6141440" y="3377445"/>
+          <a:ext cx="4686980" cy="1952544"/>
+        </p:xfrm>
+        <a:graphic>
+          <a:graphicData uri="http://schemas.openxmlformats.org/drawingml/2006/table">
+            <a:tbl>
+              <a:tblPr firstRow="1" bandRow="1">
+                <a:tableStyleId>{5C22544A-7EE6-4342-B048-85BDC9FD1C3A}</a:tableStyleId>
+              </a:tblPr>
+              <a:tblGrid>
+                <a:gridCol w="937396"/>
+                <a:gridCol w="937396"/>
+                <a:gridCol w="937396"/>
+                <a:gridCol w="937396"/>
+                <a:gridCol w="937396"/>
+              </a:tblGrid>
+              <a:tr h="325424">
+                <a:tc>
+                  <a:txBody>
+                    <a:bodyPr/>
+                    <a:lstStyle/>
+                    <a:p>
+                      <a:endParaRPr lang="es-MX" sz="1050" dirty="0"/>
+                    </a:p>
+                  </a:txBody>
+                  <a:tcPr/>
+                </a:tc>
+                <a:tc>
+                  <a:txBody>
+                    <a:bodyPr/>
+                    <a:lstStyle/>
+                    <a:p>
+                      <a:endParaRPr lang="es-MX" sz="1050"/>
+                    </a:p>
+                  </a:txBody>
+                  <a:tcPr/>
+                </a:tc>
+                <a:tc>
+                  <a:txBody>
+                    <a:bodyPr/>
+                    <a:lstStyle/>
+                    <a:p>
+                      <a:endParaRPr lang="es-MX" sz="1050"/>
+                    </a:p>
+                  </a:txBody>
+                  <a:tcPr/>
+                </a:tc>
+                <a:tc>
+                  <a:txBody>
+                    <a:bodyPr/>
+                    <a:lstStyle/>
+                    <a:p>
+                      <a:endParaRPr lang="es-MX" sz="1050"/>
+                    </a:p>
+                  </a:txBody>
+                  <a:tcPr/>
+                </a:tc>
+                <a:tc>
+                  <a:txBody>
+                    <a:bodyPr/>
+                    <a:lstStyle/>
+                    <a:p>
+                      <a:endParaRPr lang="es-MX" sz="1050"/>
+                    </a:p>
+                  </a:txBody>
+                  <a:tcPr/>
+                </a:tc>
+              </a:tr>
+              <a:tr h="325424">
+                <a:tc>
+                  <a:txBody>
+                    <a:bodyPr/>
+                    <a:lstStyle/>
+                    <a:p>
+                      <a:endParaRPr lang="es-MX" sz="1050"/>
+                    </a:p>
+                  </a:txBody>
+                  <a:tcPr/>
+                </a:tc>
+                <a:tc>
+                  <a:txBody>
+                    <a:bodyPr/>
+                    <a:lstStyle/>
+                    <a:p>
+                      <a:endParaRPr lang="es-MX" sz="1050" dirty="0"/>
+                    </a:p>
+                  </a:txBody>
+                  <a:tcPr/>
+                </a:tc>
+                <a:tc>
+                  <a:txBody>
+                    <a:bodyPr/>
+                    <a:lstStyle/>
+                    <a:p>
+                      <a:endParaRPr lang="es-MX" sz="1050"/>
+                    </a:p>
+                  </a:txBody>
+                  <a:tcPr/>
+                </a:tc>
+                <a:tc>
+                  <a:txBody>
+                    <a:bodyPr/>
+                    <a:lstStyle/>
+                    <a:p>
+                      <a:endParaRPr lang="es-MX" sz="1050"/>
+                    </a:p>
+                  </a:txBody>
+                  <a:tcPr/>
+                </a:tc>
+                <a:tc>
+                  <a:txBody>
+                    <a:bodyPr/>
+                    <a:lstStyle/>
+                    <a:p>
+                      <a:endParaRPr lang="es-MX" sz="1050"/>
+                    </a:p>
+                  </a:txBody>
+                  <a:tcPr/>
+                </a:tc>
+              </a:tr>
+              <a:tr h="325424">
+                <a:tc>
+                  <a:txBody>
+                    <a:bodyPr/>
+                    <a:lstStyle/>
+                    <a:p>
+                      <a:endParaRPr lang="es-MX" sz="1050"/>
+                    </a:p>
+                  </a:txBody>
+                  <a:tcPr/>
+                </a:tc>
+                <a:tc>
+                  <a:txBody>
+                    <a:bodyPr/>
+                    <a:lstStyle/>
+                    <a:p>
+                      <a:endParaRPr lang="es-MX" sz="1050"/>
+                    </a:p>
+                  </a:txBody>
+                  <a:tcPr/>
+                </a:tc>
+                <a:tc>
+                  <a:txBody>
+                    <a:bodyPr/>
+                    <a:lstStyle/>
+                    <a:p>
+                      <a:endParaRPr lang="es-MX" sz="1050" dirty="0"/>
+                    </a:p>
+                  </a:txBody>
+                  <a:tcPr/>
+                </a:tc>
+                <a:tc>
+                  <a:txBody>
+                    <a:bodyPr/>
+                    <a:lstStyle/>
+                    <a:p>
+                      <a:endParaRPr lang="es-MX" sz="1050"/>
+                    </a:p>
+                  </a:txBody>
+                  <a:tcPr/>
+                </a:tc>
+                <a:tc>
+                  <a:txBody>
+                    <a:bodyPr/>
+                    <a:lstStyle/>
+                    <a:p>
+                      <a:endParaRPr lang="es-MX" sz="1050"/>
+                    </a:p>
+                  </a:txBody>
+                  <a:tcPr/>
+                </a:tc>
+              </a:tr>
+              <a:tr h="325424">
+                <a:tc>
+                  <a:txBody>
+                    <a:bodyPr/>
+                    <a:lstStyle/>
+                    <a:p>
+                      <a:endParaRPr lang="es-MX" sz="1050"/>
+                    </a:p>
+                  </a:txBody>
+                  <a:tcPr/>
+                </a:tc>
+                <a:tc>
+                  <a:txBody>
+                    <a:bodyPr/>
+                    <a:lstStyle/>
+                    <a:p>
+                      <a:endParaRPr lang="es-MX" sz="1050"/>
+                    </a:p>
+                  </a:txBody>
+                  <a:tcPr/>
+                </a:tc>
+                <a:tc>
+                  <a:txBody>
+                    <a:bodyPr/>
+                    <a:lstStyle/>
+                    <a:p>
+                      <a:endParaRPr lang="es-MX" sz="1050" dirty="0"/>
+                    </a:p>
+                  </a:txBody>
+                  <a:tcPr/>
+                </a:tc>
+                <a:tc>
+                  <a:txBody>
+                    <a:bodyPr/>
+                    <a:lstStyle/>
+                    <a:p>
+                      <a:endParaRPr lang="es-MX" sz="1050" dirty="0"/>
+                    </a:p>
+                  </a:txBody>
+                  <a:tcPr/>
+                </a:tc>
+                <a:tc>
+                  <a:txBody>
+                    <a:bodyPr/>
+                    <a:lstStyle/>
+                    <a:p>
+                      <a:endParaRPr lang="es-MX" sz="1050"/>
+                    </a:p>
+                  </a:txBody>
+                  <a:tcPr/>
+                </a:tc>
+              </a:tr>
+              <a:tr h="325424">
+                <a:tc>
+                  <a:txBody>
+                    <a:bodyPr/>
+                    <a:lstStyle/>
+                    <a:p>
+                      <a:endParaRPr lang="es-MX" sz="1050"/>
+                    </a:p>
+                  </a:txBody>
+                  <a:tcPr/>
+                </a:tc>
+                <a:tc>
+                  <a:txBody>
+                    <a:bodyPr/>
+                    <a:lstStyle/>
+                    <a:p>
+                      <a:endParaRPr lang="es-MX" sz="1050"/>
+                    </a:p>
+                  </a:txBody>
+                  <a:tcPr/>
+                </a:tc>
+                <a:tc>
+                  <a:txBody>
+                    <a:bodyPr/>
+                    <a:lstStyle/>
+                    <a:p>
+                      <a:endParaRPr lang="es-MX" sz="1050"/>
+                    </a:p>
+                  </a:txBody>
+                  <a:tcPr/>
+                </a:tc>
+                <a:tc>
+                  <a:txBody>
+                    <a:bodyPr/>
+                    <a:lstStyle/>
+                    <a:p>
+                      <a:endParaRPr lang="es-MX" sz="1050" dirty="0"/>
+                    </a:p>
+                  </a:txBody>
+                  <a:tcPr/>
+                </a:tc>
+                <a:tc>
+                  <a:txBody>
+                    <a:bodyPr/>
+                    <a:lstStyle/>
+                    <a:p>
+                      <a:endParaRPr lang="es-MX" sz="1050"/>
+                    </a:p>
+                  </a:txBody>
+                  <a:tcPr/>
+                </a:tc>
+              </a:tr>
+              <a:tr h="325424">
+                <a:tc>
+                  <a:txBody>
+                    <a:bodyPr/>
+                    <a:lstStyle/>
+                    <a:p>
+                      <a:endParaRPr lang="es-MX" sz="1050"/>
+                    </a:p>
+                  </a:txBody>
+                  <a:tcPr/>
+                </a:tc>
+                <a:tc>
+                  <a:txBody>
+                    <a:bodyPr/>
+                    <a:lstStyle/>
+                    <a:p>
+                      <a:endParaRPr lang="es-MX" sz="1050"/>
+                    </a:p>
+                  </a:txBody>
+                  <a:tcPr/>
+                </a:tc>
+                <a:tc>
+                  <a:txBody>
+                    <a:bodyPr/>
+                    <a:lstStyle/>
+                    <a:p>
+                      <a:endParaRPr lang="es-MX" sz="1050"/>
+                    </a:p>
+                  </a:txBody>
+                  <a:tcPr/>
+                </a:tc>
+                <a:tc>
+                  <a:txBody>
+                    <a:bodyPr/>
+                    <a:lstStyle/>
+                    <a:p>
+                      <a:endParaRPr lang="es-MX" sz="1050" dirty="0"/>
+                    </a:p>
+                  </a:txBody>
+                  <a:tcPr/>
+                </a:tc>
+                <a:tc>
+                  <a:txBody>
+                    <a:bodyPr/>
+                    <a:lstStyle/>
+                    <a:p>
+                      <a:endParaRPr lang="es-MX" sz="1050" dirty="0"/>
+                    </a:p>
+                  </a:txBody>
+                  <a:tcPr/>
+                </a:tc>
+              </a:tr>
+            </a:tbl>
+          </a:graphicData>
+        </a:graphic>
+      </p:graphicFrame>
+      <p:sp>
+        <p:nvSpPr>
+          <p:cNvPr id="43" name="Rectángulo redondeado 42"/>
+          <p:cNvSpPr/>
+          <p:nvPr/>
+        </p:nvSpPr>
+        <p:spPr>
+          <a:xfrm>
+            <a:off x="7609619" y="5655119"/>
+            <a:ext cx="1262663" cy="446931"/>
+          </a:xfrm>
+          <a:prstGeom prst="roundRect">
+            <a:avLst/>
+          </a:prstGeom>
+        </p:spPr>
+        <p:style>
+          <a:lnRef idx="2">
+            <a:schemeClr val="accent1">
+              <a:shade val="50000"/>
+            </a:schemeClr>
+          </a:lnRef>
+          <a:fillRef idx="1">
+            <a:schemeClr val="accent1"/>
+          </a:fillRef>
+          <a:effectRef idx="0">
+            <a:schemeClr val="accent1"/>
+          </a:effectRef>
+          <a:fontRef idx="minor">
+            <a:schemeClr val="lt1"/>
+          </a:fontRef>
+        </p:style>
+        <p:txBody>
+          <a:bodyPr rtlCol="0" anchor="ctr"/>
+          <a:lstStyle/>
+          <a:p>
+            <a:pPr algn="ctr"/>
+            <a:r>
+              <a:rPr lang="es-MX" dirty="0" smtClean="0"/>
+              <a:t>exportar</a:t>
             </a:r>
             <a:endParaRPr lang="es-MX" dirty="0"/>
           </a:p>
@@ -6783,6 +7291,122 @@
     <p:extLst>
       <p:ext uri="{BB962C8B-B14F-4D97-AF65-F5344CB8AC3E}">
         <p14:creationId xmlns:p14="http://schemas.microsoft.com/office/powerpoint/2010/main" val="2436139622"/>
+      </p:ext>
+    </p:extLst>
+  </p:cSld>
+  <p:clrMapOvr>
+    <a:masterClrMapping/>
+  </p:clrMapOvr>
+</p:sld>
+</file>
+
+<file path=ppt/slides/slide4.xml><?xml version="1.0" encoding="utf-8"?>
+<p:sld xmlns:a="http://schemas.openxmlformats.org/drawingml/2006/main" xmlns:r="http://schemas.openxmlformats.org/officeDocument/2006/relationships" xmlns:p="http://schemas.openxmlformats.org/presentationml/2006/main">
+  <p:cSld>
+    <p:spTree>
+      <p:nvGrpSpPr>
+        <p:cNvPr id="1" name=""/>
+        <p:cNvGrpSpPr/>
+        <p:nvPr/>
+      </p:nvGrpSpPr>
+      <p:grpSpPr>
+        <a:xfrm>
+          <a:off x="0" y="0"/>
+          <a:ext cx="0" cy="0"/>
+          <a:chOff x="0" y="0"/>
+          <a:chExt cx="0" cy="0"/>
+        </a:xfrm>
+      </p:grpSpPr>
+      <p:sp>
+        <p:nvSpPr>
+          <p:cNvPr id="4" name="CuadroTexto 3"/>
+          <p:cNvSpPr txBox="1"/>
+          <p:nvPr/>
+        </p:nvSpPr>
+        <p:spPr>
+          <a:xfrm>
+            <a:off x="697832" y="685800"/>
+            <a:ext cx="7700210" cy="3416320"/>
+          </a:xfrm>
+          <a:prstGeom prst="rect">
+            <a:avLst/>
+          </a:prstGeom>
+          <a:noFill/>
+        </p:spPr>
+        <p:txBody>
+          <a:bodyPr wrap="square" rtlCol="0">
+            <a:spAutoFit/>
+          </a:bodyPr>
+          <a:lstStyle/>
+          <a:p>
+            <a:r>
+              <a:rPr lang="es-MX" dirty="0" smtClean="0"/>
+              <a:t>Rojo:</a:t>
+            </a:r>
+          </a:p>
+          <a:p>
+            <a:r>
+              <a:rPr lang="es-MX" dirty="0" smtClean="0"/>
+              <a:t>Roger</a:t>
+            </a:r>
+          </a:p>
+          <a:p>
+            <a:r>
+              <a:rPr lang="es-MX" dirty="0" smtClean="0"/>
+              <a:t>Martes 2 de julio</a:t>
+            </a:r>
+          </a:p>
+          <a:p>
+            <a:endParaRPr lang="es-MX" dirty="0"/>
+          </a:p>
+          <a:p>
+            <a:r>
+              <a:rPr lang="es-MX" dirty="0" smtClean="0"/>
+              <a:t>Verdes:</a:t>
+            </a:r>
+          </a:p>
+          <a:p>
+            <a:r>
+              <a:rPr lang="es-MX" dirty="0" smtClean="0"/>
+              <a:t>Vic</a:t>
+            </a:r>
+          </a:p>
+          <a:p>
+            <a:r>
+              <a:rPr lang="es-MX" dirty="0" smtClean="0"/>
+              <a:t>Martes 2 de julio</a:t>
+            </a:r>
+          </a:p>
+          <a:p>
+            <a:endParaRPr lang="es-MX" dirty="0"/>
+          </a:p>
+          <a:p>
+            <a:r>
+              <a:rPr lang="es-MX" dirty="0" smtClean="0"/>
+              <a:t>JC:</a:t>
+            </a:r>
+          </a:p>
+          <a:p>
+            <a:r>
+              <a:rPr lang="es-MX" dirty="0" smtClean="0"/>
+              <a:t>Reportes</a:t>
+            </a:r>
+          </a:p>
+          <a:p>
+            <a:r>
+              <a:rPr lang="es-MX" dirty="0" smtClean="0"/>
+              <a:t>Martes 2 de julio</a:t>
+            </a:r>
+          </a:p>
+          <a:p>
+            <a:endParaRPr lang="es-MX" dirty="0"/>
+          </a:p>
+        </p:txBody>
+      </p:sp>
+    </p:spTree>
+    <p:extLst>
+      <p:ext uri="{BB962C8B-B14F-4D97-AF65-F5344CB8AC3E}">
+        <p14:creationId xmlns:p14="http://schemas.microsoft.com/office/powerpoint/2010/main" val="4289901992"/>
       </p:ext>
     </p:extLst>
   </p:cSld>

</xml_diff>

<commit_message>
se agrego el archivo reportes y nuevos estilos
</commit_message>
<xml_diff>
--- a/Historyboard_RH.pptx
+++ b/Historyboard_RH.pptx
@@ -106,6 +106,11 @@
       </a:defRPr>
     </a:lvl9pPr>
   </p:defaultTextStyle>
+  <p:extLst>
+    <p:ext uri="{EFAFB233-063F-42B5-8137-9DF3F51BA10A}">
+      <p15:sldGuideLst xmlns:p15="http://schemas.microsoft.com/office/powerpoint/2012/main"/>
+    </p:ext>
+  </p:extLst>
 </p:presentation>
 </file>
 
@@ -3179,6 +3184,11 @@
             <a:avLst/>
           </a:prstGeom>
           <a:noFill/>
+          <a:ln>
+            <a:solidFill>
+              <a:srgbClr val="FF0000"/>
+            </a:solidFill>
+          </a:ln>
         </p:spPr>
         <p:style>
           <a:lnRef idx="2">
@@ -3499,6 +3509,11 @@
             <a:avLst/>
           </a:prstGeom>
           <a:noFill/>
+          <a:ln>
+            <a:solidFill>
+              <a:srgbClr val="FF0000"/>
+            </a:solidFill>
+          </a:ln>
         </p:spPr>
         <p:style>
           <a:lnRef idx="2">
@@ -4310,6 +4325,11 @@
             <a:avLst/>
           </a:prstGeom>
           <a:noFill/>
+          <a:ln>
+            <a:solidFill>
+              <a:srgbClr val="FF0000"/>
+            </a:solidFill>
+          </a:ln>
         </p:spPr>
         <p:style>
           <a:lnRef idx="2">
@@ -4555,6 +4575,11 @@
             <a:avLst/>
           </a:prstGeom>
           <a:noFill/>
+          <a:ln>
+            <a:solidFill>
+              <a:srgbClr val="00B050"/>
+            </a:solidFill>
+          </a:ln>
         </p:spPr>
         <p:style>
           <a:lnRef idx="2">
@@ -4867,6 +4892,11 @@
             <a:avLst/>
           </a:prstGeom>
           <a:noFill/>
+          <a:ln>
+            <a:solidFill>
+              <a:srgbClr val="00B050"/>
+            </a:solidFill>
+          </a:ln>
         </p:spPr>
         <p:style>
           <a:lnRef idx="2">
@@ -5111,6 +5141,13 @@
   <p:clrMapOvr>
     <a:masterClrMapping/>
   </p:clrMapOvr>
+  <p:timing>
+    <p:tnLst>
+      <p:par>
+        <p:cTn id="1" dur="indefinite" restart="never" nodeType="tmRoot"/>
+      </p:par>
+    </p:tnLst>
+  </p:timing>
 </p:sld>
 </file>
 
@@ -5292,6 +5329,13 @@
   <p:clrMapOvr>
     <a:masterClrMapping/>
   </p:clrMapOvr>
+  <p:timing>
+    <p:tnLst>
+      <p:par>
+        <p:cTn id="1" dur="indefinite" restart="never" nodeType="tmRoot"/>
+      </p:par>
+    </p:tnLst>
+  </p:timing>
 </p:sld>
 </file>
 

</xml_diff>